<commit_message>
changes in the pp
</commit_message>
<xml_diff>
--- a/Big Data PowerPoint.pptx
+++ b/Big Data PowerPoint.pptx
@@ -5559,7 +5559,7 @@
           <a:p>
             <a:fld id="{A60E11AC-DBF3-4C48-BC8B-EDCD1A8775A1}" type="datetimeFigureOut">
               <a:rPr lang="de-DE" smtClean="0"/>
-              <a:t>21.11.2024</a:t>
+              <a:t>22.11.2024</a:t>
             </a:fld>
             <a:endParaRPr lang="de-DE"/>
           </a:p>
@@ -6311,6 +6311,90 @@
           <a:bodyPr/>
           <a:lstStyle/>
           <a:p>
+            <a:endParaRPr lang="en-US" dirty="0"/>
+          </a:p>
+        </p:txBody>
+      </p:sp>
+      <p:sp>
+        <p:nvSpPr>
+          <p:cNvPr id="4" name="Foliennummernplatzhalter 3"/>
+          <p:cNvSpPr>
+            <a:spLocks noGrp="1"/>
+          </p:cNvSpPr>
+          <p:nvPr>
+            <p:ph type="sldNum" sz="quarter" idx="5"/>
+          </p:nvPr>
+        </p:nvSpPr>
+        <p:spPr/>
+        <p:txBody>
+          <a:bodyPr/>
+          <a:lstStyle/>
+          <a:p>
+            <a:fld id="{F51D6413-9ABB-4A2A-ABE9-43D34FF762BA}" type="slidenum">
+              <a:rPr lang="de-DE" smtClean="0"/>
+              <a:t>11</a:t>
+            </a:fld>
+            <a:endParaRPr lang="de-DE"/>
+          </a:p>
+        </p:txBody>
+      </p:sp>
+    </p:spTree>
+    <p:extLst>
+      <p:ext uri="{BB962C8B-B14F-4D97-AF65-F5344CB8AC3E}">
+        <p14:creationId xmlns:p14="http://schemas.microsoft.com/office/powerpoint/2010/main" val="3393944869"/>
+      </p:ext>
+    </p:extLst>
+  </p:cSld>
+  <p:clrMapOvr>
+    <a:masterClrMapping/>
+  </p:clrMapOvr>
+</p:notes>
+</file>
+
+<file path=ppt/notesSlides/notesSlide4.xml><?xml version="1.0" encoding="utf-8"?>
+<p:notes xmlns:a="http://schemas.openxmlformats.org/drawingml/2006/main" xmlns:r="http://schemas.openxmlformats.org/officeDocument/2006/relationships" xmlns:p="http://schemas.openxmlformats.org/presentationml/2006/main">
+  <p:cSld>
+    <p:spTree>
+      <p:nvGrpSpPr>
+        <p:cNvPr id="1" name=""/>
+        <p:cNvGrpSpPr/>
+        <p:nvPr/>
+      </p:nvGrpSpPr>
+      <p:grpSpPr>
+        <a:xfrm>
+          <a:off x="0" y="0"/>
+          <a:ext cx="0" cy="0"/>
+          <a:chOff x="0" y="0"/>
+          <a:chExt cx="0" cy="0"/>
+        </a:xfrm>
+      </p:grpSpPr>
+      <p:sp>
+        <p:nvSpPr>
+          <p:cNvPr id="2" name="Folienbildplatzhalter 1"/>
+          <p:cNvSpPr>
+            <a:spLocks noGrp="1" noRot="1" noChangeAspect="1"/>
+          </p:cNvSpPr>
+          <p:nvPr>
+            <p:ph type="sldImg"/>
+          </p:nvPr>
+        </p:nvSpPr>
+        <p:spPr/>
+      </p:sp>
+      <p:sp>
+        <p:nvSpPr>
+          <p:cNvPr id="3" name="Notizenplatzhalter 2"/>
+          <p:cNvSpPr>
+            <a:spLocks noGrp="1"/>
+          </p:cNvSpPr>
+          <p:nvPr>
+            <p:ph type="body" idx="1"/>
+          </p:nvPr>
+        </p:nvSpPr>
+        <p:spPr/>
+        <p:txBody>
+          <a:bodyPr/>
+          <a:lstStyle/>
+          <a:p>
             <a:pPr marL="0" marR="0" lvl="0" indent="0" algn="l" defTabSz="914400" rtl="0" eaLnBrk="1" fontAlgn="auto" latinLnBrk="0" hangingPunct="1">
               <a:lnSpc>
                 <a:spcPct val="100000"/>
@@ -6422,7 +6506,7 @@
 </p:notes>
 </file>
 
-<file path=ppt/notesSlides/notesSlide4.xml><?xml version="1.0" encoding="utf-8"?>
+<file path=ppt/notesSlides/notesSlide5.xml><?xml version="1.0" encoding="utf-8"?>
 <p:notes xmlns:a="http://schemas.openxmlformats.org/drawingml/2006/main" xmlns:r="http://schemas.openxmlformats.org/officeDocument/2006/relationships" xmlns:p="http://schemas.openxmlformats.org/presentationml/2006/main">
   <p:cSld>
     <p:spTree>
@@ -6692,7 +6776,7 @@
           <a:p>
             <a:fld id="{421429EC-E830-402C-9143-265CDD5D8B9B}" type="datetime1">
               <a:rPr lang="de-DE" smtClean="0"/>
-              <a:t>21.11.2024</a:t>
+              <a:t>22.11.2024</a:t>
             </a:fld>
             <a:endParaRPr lang="de-DE"/>
           </a:p>
@@ -6893,7 +6977,7 @@
           <a:p>
             <a:fld id="{9494178A-F543-45D7-AD16-9236E3AC3EFC}" type="datetime1">
               <a:rPr lang="de-DE" smtClean="0"/>
-              <a:t>21.11.2024</a:t>
+              <a:t>22.11.2024</a:t>
             </a:fld>
             <a:endParaRPr lang="de-DE"/>
           </a:p>
@@ -7104,7 +7188,7 @@
           <a:p>
             <a:fld id="{985BBF7A-3C49-4FA5-AE87-D1D6488045C0}" type="datetime1">
               <a:rPr lang="de-DE" smtClean="0"/>
-              <a:t>21.11.2024</a:t>
+              <a:t>22.11.2024</a:t>
             </a:fld>
             <a:endParaRPr lang="de-DE"/>
           </a:p>
@@ -7305,7 +7389,7 @@
           <a:p>
             <a:fld id="{9FF344C1-1BDB-4537-ADA2-16BB227EE11E}" type="datetime1">
               <a:rPr lang="de-DE" smtClean="0"/>
-              <a:t>21.11.2024</a:t>
+              <a:t>22.11.2024</a:t>
             </a:fld>
             <a:endParaRPr lang="de-DE"/>
           </a:p>
@@ -7583,7 +7667,7 @@
           <a:p>
             <a:fld id="{0270E68D-6FEE-4CB7-A58D-10E8F590C538}" type="datetime1">
               <a:rPr lang="de-DE" smtClean="0"/>
-              <a:t>21.11.2024</a:t>
+              <a:t>22.11.2024</a:t>
             </a:fld>
             <a:endParaRPr lang="de-DE"/>
           </a:p>
@@ -7851,7 +7935,7 @@
           <a:p>
             <a:fld id="{0463F94B-7E2E-4668-A43D-119FE36C3483}" type="datetime1">
               <a:rPr lang="de-DE" smtClean="0"/>
-              <a:t>21.11.2024</a:t>
+              <a:t>22.11.2024</a:t>
             </a:fld>
             <a:endParaRPr lang="de-DE"/>
           </a:p>
@@ -8266,7 +8350,7 @@
           <a:p>
             <a:fld id="{4774EDCB-EFE2-4E98-B89D-DE9142A3AFFD}" type="datetime1">
               <a:rPr lang="de-DE" smtClean="0"/>
-              <a:t>21.11.2024</a:t>
+              <a:t>22.11.2024</a:t>
             </a:fld>
             <a:endParaRPr lang="de-DE"/>
           </a:p>
@@ -8410,7 +8494,7 @@
           <a:p>
             <a:fld id="{560FBD54-47D4-4B26-B9F6-42D5CE3E19EB}" type="datetime1">
               <a:rPr lang="de-DE" smtClean="0"/>
-              <a:t>21.11.2024</a:t>
+              <a:t>22.11.2024</a:t>
             </a:fld>
             <a:endParaRPr lang="de-DE"/>
           </a:p>
@@ -8526,7 +8610,7 @@
           <a:p>
             <a:fld id="{06FB5161-7E6C-414B-8396-5BCAB2D24204}" type="datetime1">
               <a:rPr lang="de-DE" smtClean="0"/>
-              <a:t>21.11.2024</a:t>
+              <a:t>22.11.2024</a:t>
             </a:fld>
             <a:endParaRPr lang="de-DE"/>
           </a:p>
@@ -8840,7 +8924,7 @@
           <a:p>
             <a:fld id="{F0F5F3F4-FD94-4BE7-BFC1-82F8AF907D5C}" type="datetime1">
               <a:rPr lang="de-DE" smtClean="0"/>
-              <a:t>21.11.2024</a:t>
+              <a:t>22.11.2024</a:t>
             </a:fld>
             <a:endParaRPr lang="de-DE"/>
           </a:p>
@@ -9134,7 +9218,7 @@
           <a:p>
             <a:fld id="{89B6351D-D559-4535-A520-58439F945D07}" type="datetime1">
               <a:rPr lang="de-DE" smtClean="0"/>
-              <a:t>21.11.2024</a:t>
+              <a:t>22.11.2024</a:t>
             </a:fld>
             <a:endParaRPr lang="de-DE"/>
           </a:p>
@@ -9378,7 +9462,7 @@
           <a:p>
             <a:fld id="{942E94D9-7031-4E23-8333-394D4C1F12B8}" type="datetime1">
               <a:rPr lang="de-DE" smtClean="0"/>
-              <a:t>21.11.2024</a:t>
+              <a:t>22.11.2024</a:t>
             </a:fld>
             <a:endParaRPr lang="de-DE"/>
           </a:p>
@@ -10165,7 +10249,7 @@
                   <a:spcPts val="600"/>
                 </a:spcAft>
               </a:pPr>
-              <a:t>21.11.2024</a:t>
+              <a:t>22.11.2024</a:t>
             </a:fld>
             <a:endParaRPr lang="de-DE" dirty="0">
               <a:solidFill>
@@ -10769,7 +10853,7 @@
                   <a:spcPts val="600"/>
                 </a:spcAft>
               </a:pPr>
-              <a:t>21.11.2024</a:t>
+              <a:t>22.11.2024</a:t>
             </a:fld>
             <a:endParaRPr lang="de-DE">
               <a:solidFill>
@@ -11285,7 +11369,7 @@
         </p:nvSpPr>
         <p:spPr>
           <a:xfrm>
-            <a:off x="1115568" y="6356350"/>
+            <a:off x="1115568" y="6309360"/>
             <a:ext cx="2743200" cy="365125"/>
           </a:xfrm>
         </p:spPr>
@@ -11314,7 +11398,7 @@
                   <a:spcPts val="600"/>
                 </a:spcAft>
               </a:pPr>
-              <a:t>21.11.2024</a:t>
+              <a:t>22.11.2024</a:t>
             </a:fld>
             <a:endParaRPr lang="de-DE">
               <a:solidFill>
@@ -11389,10 +11473,10 @@
       </p:sp>
       <p:grpSp>
         <p:nvGrpSpPr>
-          <p:cNvPr id="9" name="Gruppieren 8">
+          <p:cNvPr id="3" name="Gruppieren 2">
             <a:extLst>
               <a:ext uri="{FF2B5EF4-FFF2-40B4-BE49-F238E27FC236}">
-                <a16:creationId xmlns:a16="http://schemas.microsoft.com/office/drawing/2014/main" id="{3551D448-6625-C60D-6A58-5588C2F80138}"/>
+                <a16:creationId xmlns:a16="http://schemas.microsoft.com/office/drawing/2014/main" id="{8C54C1AC-5CD0-36C1-9E89-4B3A0F5EBE56}"/>
               </a:ext>
             </a:extLst>
           </p:cNvPr>
@@ -11401,41 +11485,12 @@
         </p:nvGrpSpPr>
         <p:grpSpPr>
           <a:xfrm>
-            <a:off x="685921" y="2391156"/>
-            <a:ext cx="11027422" cy="2630836"/>
-            <a:chOff x="695186" y="2276856"/>
-            <a:chExt cx="11027422" cy="2630836"/>
+            <a:off x="797155" y="2733076"/>
+            <a:ext cx="10804953" cy="2497684"/>
+            <a:chOff x="685921" y="2467606"/>
+            <a:chExt cx="10804953" cy="2497684"/>
           </a:xfrm>
         </p:grpSpPr>
-        <p:pic>
-          <p:nvPicPr>
-            <p:cNvPr id="6" name="Grafik 5">
-              <a:extLst>
-                <a:ext uri="{FF2B5EF4-FFF2-40B4-BE49-F238E27FC236}">
-                  <a16:creationId xmlns:a16="http://schemas.microsoft.com/office/drawing/2014/main" id="{1B23398C-90A2-50C6-153F-614630CDB74C}"/>
-                </a:ext>
-              </a:extLst>
-            </p:cNvPr>
-            <p:cNvPicPr>
-              <a:picLocks noChangeAspect="1"/>
-            </p:cNvPicPr>
-            <p:nvPr/>
-          </p:nvPicPr>
-          <p:blipFill>
-            <a:blip r:embed="rId2"/>
-            <a:srcRect l="12355" t="36383" r="1975" b="3444"/>
-            <a:stretch/>
-          </p:blipFill>
-          <p:spPr>
-            <a:xfrm>
-              <a:off x="1026657" y="2276856"/>
-              <a:ext cx="10695951" cy="2630836"/>
-            </a:xfrm>
-            <a:prstGeom prst="rect">
-              <a:avLst/>
-            </a:prstGeom>
-          </p:spPr>
-        </p:pic>
         <p:pic>
           <p:nvPicPr>
             <p:cNvPr id="8" name="Grafik 7">
@@ -11451,18 +11506,63 @@
             <p:nvPr/>
           </p:nvPicPr>
           <p:blipFill>
-            <a:blip r:embed="rId2"/>
+            <a:blip r:embed="rId3"/>
             <a:srcRect l="12584" t="38897" r="79583" b="10727"/>
             <a:stretch/>
           </p:blipFill>
           <p:spPr>
             <a:xfrm>
-              <a:off x="695186" y="2353306"/>
+              <a:off x="685921" y="2467606"/>
               <a:ext cx="1330463" cy="2151387"/>
             </a:xfrm>
             <a:prstGeom prst="rect">
               <a:avLst/>
             </a:prstGeom>
+          </p:spPr>
+        </p:pic>
+        <p:pic>
+          <p:nvPicPr>
+            <p:cNvPr id="1026" name="Picture 2" descr="image">
+              <a:extLst>
+                <a:ext uri="{FF2B5EF4-FFF2-40B4-BE49-F238E27FC236}">
+                  <a16:creationId xmlns:a16="http://schemas.microsoft.com/office/drawing/2014/main" id="{A7217D44-5DA9-782F-0338-FF0472132E60}"/>
+                </a:ext>
+              </a:extLst>
+            </p:cNvPr>
+            <p:cNvPicPr>
+              <a:picLocks noChangeAspect="1" noChangeArrowheads="1"/>
+            </p:cNvPicPr>
+            <p:nvPr/>
+          </p:nvPicPr>
+          <p:blipFill rotWithShape="1">
+            <a:blip r:embed="rId4">
+              <a:extLst>
+                <a:ext uri="{28A0092B-C50C-407E-A947-70E740481C1C}">
+                  <a14:useLocalDpi xmlns:a14="http://schemas.microsoft.com/office/drawing/2010/main" val="0"/>
+                </a:ext>
+              </a:extLst>
+            </a:blip>
+            <a:srcRect l="9150"/>
+            <a:stretch/>
+          </p:blipFill>
+          <p:spPr bwMode="auto">
+            <a:xfrm>
+              <a:off x="2016384" y="2467606"/>
+              <a:ext cx="9474490" cy="2497684"/>
+            </a:xfrm>
+            <a:prstGeom prst="rect">
+              <a:avLst/>
+            </a:prstGeom>
+            <a:noFill/>
+            <a:extLst>
+              <a:ext uri="{909E8E84-426E-40DD-AFC4-6F175D3DCCD1}">
+                <a14:hiddenFill xmlns:a14="http://schemas.microsoft.com/office/drawing/2010/main">
+                  <a:solidFill>
+                    <a:srgbClr val="FFFFFF"/>
+                  </a:solidFill>
+                </a14:hiddenFill>
+              </a:ext>
+            </a:extLst>
           </p:spPr>
         </p:pic>
       </p:grpSp>
@@ -11909,7 +12009,7 @@
                   <a:spcPts val="600"/>
                 </a:spcAft>
               </a:pPr>
-              <a:t>21.11.2024</a:t>
+              <a:t>22.11.2024</a:t>
             </a:fld>
             <a:endParaRPr lang="de-DE">
               <a:solidFill>
@@ -13441,7 +13541,7 @@
                   <a:spcPts val="600"/>
                 </a:spcAft>
               </a:pPr>
-              <a:t>11/21/2024</a:t>
+              <a:t>11/22/2024</a:t>
             </a:fld>
             <a:endParaRPr lang="en-US">
               <a:solidFill>
@@ -14096,7 +14196,7 @@
                   <a:spcPts val="600"/>
                 </a:spcAft>
               </a:pPr>
-              <a:t>21.11.2024</a:t>
+              <a:t>22.11.2024</a:t>
             </a:fld>
             <a:endParaRPr lang="de-DE">
               <a:solidFill>
@@ -14642,7 +14742,7 @@
                   <a:spcPts val="600"/>
                 </a:spcAft>
               </a:pPr>
-              <a:t>21.11.2024</a:t>
+              <a:t>22.11.2024</a:t>
             </a:fld>
             <a:endParaRPr lang="de-DE">
               <a:solidFill>
@@ -15356,7 +15456,7 @@
                   <a:spcPts val="600"/>
                 </a:spcAft>
               </a:pPr>
-              <a:t>11/21/2024</a:t>
+              <a:t>11/22/2024</a:t>
             </a:fld>
             <a:endParaRPr lang="en-US">
               <a:solidFill>
@@ -16058,7 +16158,7 @@
                   <a:spcPts val="600"/>
                 </a:spcAft>
               </a:pPr>
-              <a:t>11/21/2024</a:t>
+              <a:t>11/22/2024</a:t>
             </a:fld>
             <a:endParaRPr lang="en-US">
               <a:solidFill>
@@ -16620,7 +16720,7 @@
                   <a:spcPts val="600"/>
                 </a:spcAft>
               </a:pPr>
-              <a:t>21.11.2024</a:t>
+              <a:t>22.11.2024</a:t>
             </a:fld>
             <a:endParaRPr lang="de-DE">
               <a:solidFill>
@@ -17174,7 +17274,7 @@
                   <a:spcPts val="600"/>
                 </a:spcAft>
               </a:pPr>
-              <a:t>21.11.2024</a:t>
+              <a:t>22.11.2024</a:t>
             </a:fld>
             <a:endParaRPr lang="de-DE">
               <a:solidFill>
@@ -19971,7 +20071,7 @@
                   <a:spcPts val="600"/>
                 </a:spcAft>
               </a:pPr>
-              <a:t>21.11.2024</a:t>
+              <a:t>22.11.2024</a:t>
             </a:fld>
             <a:endParaRPr lang="de-DE" dirty="0">
               <a:solidFill>
@@ -21517,7 +21617,7 @@
                   <a:spcPts val="600"/>
                 </a:spcAft>
               </a:pPr>
-              <a:t>21.11.2024</a:t>
+              <a:t>22.11.2024</a:t>
             </a:fld>
             <a:endParaRPr lang="de-DE">
               <a:solidFill>
@@ -23589,7 +23689,7 @@
                   <a:spcPts val="600"/>
                 </a:spcAft>
               </a:pPr>
-              <a:t>21.11.2024</a:t>
+              <a:t>22.11.2024</a:t>
             </a:fld>
             <a:endParaRPr lang="de-DE" dirty="0">
               <a:solidFill>
@@ -25311,7 +25411,7 @@
                   <a:spcPts val="600"/>
                 </a:spcAft>
               </a:pPr>
-              <a:t>21.11.2024</a:t>
+              <a:t>22.11.2024</a:t>
             </a:fld>
             <a:endParaRPr lang="de-DE">
               <a:solidFill>
@@ -26046,7 +26146,7 @@
                   <a:spcPts val="600"/>
                 </a:spcAft>
               </a:pPr>
-              <a:t>21.11.2024</a:t>
+              <a:t>22.11.2024</a:t>
             </a:fld>
             <a:endParaRPr lang="de-DE">
               <a:solidFill>
@@ -26691,7 +26791,7 @@
                   <a:spcPts val="600"/>
                 </a:spcAft>
               </a:pPr>
-              <a:t>21.11.2024</a:t>
+              <a:t>22.11.2024</a:t>
             </a:fld>
             <a:endParaRPr lang="de-DE">
               <a:solidFill>
@@ -27295,7 +27395,7 @@
                   <a:spcPts val="600"/>
                 </a:spcAft>
               </a:pPr>
-              <a:t>21.11.2024</a:t>
+              <a:t>22.11.2024</a:t>
             </a:fld>
             <a:endParaRPr lang="de-DE">
               <a:solidFill>
@@ -27896,7 +27996,7 @@
                   <a:spcPts val="600"/>
                 </a:spcAft>
               </a:pPr>
-              <a:t>21.11.2024</a:t>
+              <a:t>22.11.2024</a:t>
             </a:fld>
             <a:endParaRPr lang="de-DE">
               <a:solidFill>
@@ -28605,7 +28705,7 @@
                   <a:spcPts val="600"/>
                 </a:spcAft>
               </a:pPr>
-              <a:t>11/21/2024</a:t>
+              <a:t>11/22/2024</a:t>
             </a:fld>
             <a:endParaRPr lang="en-US">
               <a:solidFill>
@@ -29253,7 +29353,7 @@
                   <a:spcPts val="600"/>
                 </a:spcAft>
               </a:pPr>
-              <a:t>21.11.2024</a:t>
+              <a:t>22.11.2024</a:t>
             </a:fld>
             <a:endParaRPr lang="de-DE">
               <a:solidFill>
@@ -29406,17 +29506,6 @@
           <a:p>
             <a:r>
               <a:rPr lang="de-DE" sz="2000" dirty="0">
-                <a:ea typeface="Times New Roman" panose="02020603050405020304" pitchFamily="18" charset="0"/>
-              </a:rPr>
-              <a:t>Umfassendes Angebot an SDKs für die API</a:t>
-            </a:r>
-            <a:endParaRPr lang="de-DE" sz="1600" dirty="0">
-              <a:ea typeface="Times New Roman" panose="02020603050405020304" pitchFamily="18" charset="0"/>
-            </a:endParaRPr>
-          </a:p>
-          <a:p>
-            <a:r>
-              <a:rPr lang="de-DE" sz="2000" dirty="0">
                 <a:effectLst/>
                 <a:ea typeface="Times New Roman" panose="02020603050405020304" pitchFamily="18" charset="0"/>
               </a:rPr>
@@ -29429,10 +29518,14 @@
               </a:rPr>
               <a:t>Informationen über Karten und Sets</a:t>
             </a:r>
-            <a:endParaRPr lang="de-DE" sz="2000" dirty="0">
-              <a:effectLst/>
-              <a:ea typeface="Times New Roman" panose="02020603050405020304" pitchFamily="18" charset="0"/>
-            </a:endParaRPr>
+          </a:p>
+          <a:p>
+            <a:r>
+              <a:rPr lang="de-DE" sz="2000" dirty="0">
+                <a:ea typeface="Times New Roman" panose="02020603050405020304" pitchFamily="18" charset="0"/>
+              </a:rPr>
+              <a:t>Umfassendes Angebot an SDKs für die API</a:t>
+            </a:r>
           </a:p>
         </p:txBody>
       </p:sp>
@@ -29879,7 +29972,7 @@
                   <a:spcPts val="600"/>
                 </a:spcAft>
               </a:pPr>
-              <a:t>21.11.2024</a:t>
+              <a:t>22.11.2024</a:t>
             </a:fld>
             <a:endParaRPr lang="de-DE">
               <a:solidFill>
@@ -30003,6 +30096,43 @@
                 <a:sym typeface="Wingdings" panose="05000000000000000000" pitchFamily="2" charset="2"/>
               </a:rPr>
               <a:t>Es gibt auch Karten, in denen nicht alle Attribute belegt sind  null-Werte</a:t>
+            </a:r>
+          </a:p>
+          <a:p>
+            <a:r>
+              <a:rPr lang="de-DE" sz="2000" dirty="0" err="1">
+                <a:effectLst/>
+                <a:ea typeface="Times New Roman" panose="02020603050405020304" pitchFamily="18" charset="0"/>
+                <a:sym typeface="Wingdings" panose="05000000000000000000" pitchFamily="2" charset="2"/>
+              </a:rPr>
+              <a:t>Insgeamt</a:t>
+            </a:r>
+            <a:r>
+              <a:rPr lang="de-DE" sz="2000" dirty="0">
+                <a:effectLst/>
+                <a:ea typeface="Times New Roman" panose="02020603050405020304" pitchFamily="18" charset="0"/>
+                <a:sym typeface="Wingdings" panose="05000000000000000000" pitchFamily="2" charset="2"/>
+              </a:rPr>
+              <a:t> </a:t>
+            </a:r>
+            <a:r>
+              <a:rPr lang="de-DE" sz="1800" dirty="0">
+                <a:effectLst/>
+                <a:latin typeface="Aptos" panose="020B0004020202020204" pitchFamily="34" charset="0"/>
+                <a:ea typeface="Aptos" panose="020B0004020202020204" pitchFamily="34" charset="0"/>
+                <a:cs typeface="Times New Roman" panose="02020603050405020304" pitchFamily="18" charset="0"/>
+              </a:rPr>
+              <a:t>93.643 </a:t>
+            </a:r>
+            <a:r>
+              <a:rPr lang="de-DE" sz="2000" dirty="0">
+                <a:effectLst/>
+                <a:latin typeface="Aptos" panose="020B0004020202020204" pitchFamily="34" charset="0"/>
+                <a:ea typeface="Aptos" panose="020B0004020202020204" pitchFamily="34" charset="0"/>
+                <a:cs typeface="Times New Roman" panose="02020603050405020304" pitchFamily="18" charset="0"/>
+                <a:sym typeface="Wingdings" panose="05000000000000000000" pitchFamily="2" charset="2"/>
+              </a:rPr>
+              <a:t>Karten</a:t>
             </a:r>
             <a:endParaRPr lang="de-DE" sz="2000" dirty="0">
               <a:effectLst/>
@@ -31912,7 +32042,7 @@
                   <a:spcPts val="600"/>
                 </a:spcAft>
               </a:pPr>
-              <a:t>21.11.2024</a:t>
+              <a:t>22.11.2024</a:t>
             </a:fld>
             <a:endParaRPr lang="de-DE">
               <a:solidFill>
@@ -32807,7 +32937,7 @@
                   <a:spcPts val="600"/>
                 </a:spcAft>
               </a:pPr>
-              <a:t>11/21/2024</a:t>
+              <a:t>11/22/2024</a:t>
             </a:fld>
             <a:endParaRPr lang="en-US">
               <a:solidFill>
@@ -33455,7 +33585,7 @@
                   <a:spcPts val="600"/>
                 </a:spcAft>
               </a:pPr>
-              <a:t>21.11.2024</a:t>
+              <a:t>22.11.2024</a:t>
             </a:fld>
             <a:endParaRPr lang="de-DE">
               <a:solidFill>
@@ -34068,7 +34198,7 @@
                   <a:spcPts val="600"/>
                 </a:spcAft>
               </a:pPr>
-              <a:t>11/21/2024</a:t>
+              <a:t>11/22/2024</a:t>
             </a:fld>
             <a:endParaRPr lang="en-US">
               <a:solidFill>
@@ -34928,6 +35058,15 @@
 </file>
 
 <file path=customXml/item2.xml><?xml version="1.0" encoding="utf-8"?>
+<?mso-contentType ?>
+<FormTemplates xmlns="http://schemas.microsoft.com/sharepoint/v3/contenttype/forms">
+  <Display>DocumentLibraryForm</Display>
+  <Edit>DocumentLibraryForm</Edit>
+  <New>DocumentLibraryForm</New>
+</FormTemplates>
+</file>
+
+<file path=customXml/item3.xml><?xml version="1.0" encoding="utf-8"?>
 <ct:contentTypeSchema xmlns:ct="http://schemas.microsoft.com/office/2006/metadata/contentType" xmlns:ma="http://schemas.microsoft.com/office/2006/metadata/properties/metaAttributes" ct:_="" ma:_="" ma:contentTypeName="Dokument" ma:contentTypeID="0x010100C4D2FC58B8B69A4EA15BDDF73928E1B2" ma:contentTypeVersion="14" ma:contentTypeDescription="Ein neues Dokument erstellen." ma:contentTypeScope="" ma:versionID="8151648de613faf6d648826876e7f8c5">
   <xsd:schema xmlns:xsd="http://www.w3.org/2001/XMLSchema" xmlns:xs="http://www.w3.org/2001/XMLSchema" xmlns:p="http://schemas.microsoft.com/office/2006/metadata/properties" xmlns:ns3="b9d66492-098a-43f0-90e2-715ac41169c8" xmlns:ns4="6f4fc464-da37-4b30-a2a8-d1e97d915e8d" targetNamespace="http://schemas.microsoft.com/office/2006/metadata/properties" ma:root="true" ma:fieldsID="9036812c04fc537efdace2504267c3e8" ns3:_="" ns4:_="">
     <xsd:import namespace="b9d66492-098a-43f0-90e2-715ac41169c8"/>
@@ -35154,15 +35293,6 @@
 </ct:contentTypeSchema>
 </file>
 
-<file path=customXml/item3.xml><?xml version="1.0" encoding="utf-8"?>
-<?mso-contentType ?>
-<FormTemplates xmlns="http://schemas.microsoft.com/sharepoint/v3/contenttype/forms">
-  <Display>DocumentLibraryForm</Display>
-  <Edit>DocumentLibraryForm</Edit>
-  <New>DocumentLibraryForm</New>
-</FormTemplates>
-</file>
-
 <file path=customXml/itemProps1.xml><?xml version="1.0" encoding="utf-8"?>
 <ds:datastoreItem xmlns:ds="http://schemas.openxmlformats.org/officeDocument/2006/customXml" ds:itemID="{069D66B6-B179-4E3C-AAE4-BC4602C97CE5}">
   <ds:schemaRefs>
@@ -35181,6 +35311,14 @@
 </file>
 
 <file path=customXml/itemProps2.xml><?xml version="1.0" encoding="utf-8"?>
+<ds:datastoreItem xmlns:ds="http://schemas.openxmlformats.org/officeDocument/2006/customXml" ds:itemID="{A07979F2-40D4-4CE5-8549-57C04D6B811A}">
+  <ds:schemaRefs>
+    <ds:schemaRef ds:uri="http://schemas.microsoft.com/sharepoint/v3/contenttype/forms"/>
+  </ds:schemaRefs>
+</ds:datastoreItem>
+</file>
+
+<file path=customXml/itemProps3.xml><?xml version="1.0" encoding="utf-8"?>
 <ds:datastoreItem xmlns:ds="http://schemas.openxmlformats.org/officeDocument/2006/customXml" ds:itemID="{DD11B407-EF0E-45F6-A8D2-D284DD67FDCD}">
   <ds:schemaRefs>
     <ds:schemaRef ds:uri="6f4fc464-da37-4b30-a2a8-d1e97d915e8d"/>
@@ -35198,12 +35336,4 @@
     <ds:schemaRef ds:uri="http://www.w3.org/2001/XMLSchema"/>
   </ds:schemaRefs>
 </ds:datastoreItem>
-</file>
-
-<file path=customXml/itemProps3.xml><?xml version="1.0" encoding="utf-8"?>
-<ds:datastoreItem xmlns:ds="http://schemas.openxmlformats.org/officeDocument/2006/customXml" ds:itemID="{A07979F2-40D4-4CE5-8549-57C04D6B811A}">
-  <ds:schemaRefs>
-    <ds:schemaRef ds:uri="http://schemas.microsoft.com/sharepoint/v3/contenttype/forms"/>
-  </ds:schemaRefs>
-</ds:datastoreItem>
 </file>
</xml_diff>